<commit_message>
update and removal of needed files
</commit_message>
<xml_diff>
--- a/Microsoft_Open_Source_PowerShell.pptx
+++ b/Microsoft_Open_Source_PowerShell.pptx
@@ -5,14 +5,15 @@
     <p:sldMasterId id="2147483649" r:id="rId1"/>
   </p:sldMasterIdLst>
   <p:notesMasterIdLst>
-    <p:notesMasterId r:id="rId4"/>
+    <p:notesMasterId r:id="rId5"/>
   </p:notesMasterIdLst>
   <p:handoutMasterIdLst>
-    <p:handoutMasterId r:id="rId5"/>
+    <p:handoutMasterId r:id="rId6"/>
   </p:handoutMasterIdLst>
   <p:sldIdLst>
     <p:sldId id="327" r:id="rId2"/>
     <p:sldId id="329" r:id="rId3"/>
+    <p:sldId id="330" r:id="rId4"/>
   </p:sldIdLst>
   <p:sldSz cx="12192000" cy="6858000"/>
   <p:notesSz cx="6858000" cy="9144000"/>
@@ -215,7 +216,7 @@
           <a:p>
             <a:fld id="{BE1B5227-671A-4331-BA8E-6A194D65408B}" type="datetimeFigureOut">
               <a:rPr lang="en-US" smtClean="0"/>
-              <a:t>10/7/16</a:t>
+              <a:t>10/8/16</a:t>
             </a:fld>
             <a:endParaRPr lang="en-US"/>
           </a:p>
@@ -380,7 +381,7 @@
           <a:p>
             <a:fld id="{27872E6B-C85C-424E-AD51-4389090A2C7D}" type="datetimeFigureOut">
               <a:rPr lang="en-US" smtClean="0"/>
-              <a:t>10/7/16</a:t>
+              <a:t>10/8/16</a:t>
             </a:fld>
             <a:endParaRPr lang="en-US"/>
           </a:p>
@@ -807,6 +808,90 @@
     <p:extLst>
       <p:ext uri="{BB962C8B-B14F-4D97-AF65-F5344CB8AC3E}">
         <p14:creationId xmlns:p14="http://schemas.microsoft.com/office/powerpoint/2010/main" val="1024612886"/>
+      </p:ext>
+    </p:extLst>
+  </p:cSld>
+  <p:clrMapOvr>
+    <a:masterClrMapping/>
+  </p:clrMapOvr>
+</p:notes>
+</file>
+
+<file path=ppt/notesSlides/notesSlide3.xml><?xml version="1.0" encoding="utf-8"?>
+<p:notes xmlns:a="http://schemas.openxmlformats.org/drawingml/2006/main" xmlns:r="http://schemas.openxmlformats.org/officeDocument/2006/relationships" xmlns:p="http://schemas.openxmlformats.org/presentationml/2006/main">
+  <p:cSld>
+    <p:spTree>
+      <p:nvGrpSpPr>
+        <p:cNvPr id="1" name=""/>
+        <p:cNvGrpSpPr/>
+        <p:nvPr/>
+      </p:nvGrpSpPr>
+      <p:grpSpPr>
+        <a:xfrm>
+          <a:off x="0" y="0"/>
+          <a:ext cx="0" cy="0"/>
+          <a:chOff x="0" y="0"/>
+          <a:chExt cx="0" cy="0"/>
+        </a:xfrm>
+      </p:grpSpPr>
+      <p:sp>
+        <p:nvSpPr>
+          <p:cNvPr id="2" name="Slide Image Placeholder 1"/>
+          <p:cNvSpPr>
+            <a:spLocks noGrp="1" noRot="1" noChangeAspect="1"/>
+          </p:cNvSpPr>
+          <p:nvPr>
+            <p:ph type="sldImg"/>
+          </p:nvPr>
+        </p:nvSpPr>
+        <p:spPr/>
+      </p:sp>
+      <p:sp>
+        <p:nvSpPr>
+          <p:cNvPr id="3" name="Notes Placeholder 2"/>
+          <p:cNvSpPr>
+            <a:spLocks noGrp="1"/>
+          </p:cNvSpPr>
+          <p:nvPr>
+            <p:ph type="body" idx="1"/>
+          </p:nvPr>
+        </p:nvSpPr>
+        <p:spPr/>
+        <p:txBody>
+          <a:bodyPr/>
+          <a:lstStyle/>
+          <a:p>
+            <a:endParaRPr lang="en-US"/>
+          </a:p>
+        </p:txBody>
+      </p:sp>
+      <p:sp>
+        <p:nvSpPr>
+          <p:cNvPr id="4" name="Slide Number Placeholder 3"/>
+          <p:cNvSpPr>
+            <a:spLocks noGrp="1"/>
+          </p:cNvSpPr>
+          <p:nvPr>
+            <p:ph type="sldNum" sz="quarter" idx="10"/>
+          </p:nvPr>
+        </p:nvSpPr>
+        <p:spPr/>
+        <p:txBody>
+          <a:bodyPr/>
+          <a:lstStyle/>
+          <a:p>
+            <a:fld id="{1112285D-B62D-0345-9A0E-5D91D31CA9B6}" type="slidenum">
+              <a:rPr lang="en-US" smtClean="0"/>
+              <a:t>3</a:t>
+            </a:fld>
+            <a:endParaRPr lang="en-US"/>
+          </a:p>
+        </p:txBody>
+      </p:sp>
+    </p:spTree>
+    <p:extLst>
+      <p:ext uri="{BB962C8B-B14F-4D97-AF65-F5344CB8AC3E}">
+        <p14:creationId xmlns:p14="http://schemas.microsoft.com/office/powerpoint/2010/main" val="2121660873"/>
       </p:ext>
     </p:extLst>
   </p:cSld>
@@ -12406,7 +12491,12 @@
             <p:ph type="body" sz="quarter" idx="13"/>
           </p:nvPr>
         </p:nvSpPr>
-        <p:spPr/>
+        <p:spPr>
+          <a:xfrm>
+            <a:off x="963976" y="3293590"/>
+            <a:ext cx="10516334" cy="410505"/>
+          </a:xfrm>
+        </p:spPr>
         <p:txBody>
           <a:bodyPr/>
           <a:lstStyle/>
@@ -12466,6 +12556,150 @@
     <p:extLst>
       <p:ext uri="{BB962C8B-B14F-4D97-AF65-F5344CB8AC3E}">
         <p14:creationId xmlns:p14="http://schemas.microsoft.com/office/powerpoint/2010/main" val="1831433791"/>
+      </p:ext>
+    </p:extLst>
+  </p:cSld>
+  <p:clrMapOvr>
+    <a:masterClrMapping/>
+  </p:clrMapOvr>
+  <mc:AlternateContent xmlns:mc="http://schemas.openxmlformats.org/markup-compatibility/2006" xmlns:p14="http://schemas.microsoft.com/office/powerpoint/2010/main">
+    <mc:Choice Requires="p14">
+      <p:transition spd="slow" p14:dur="2000"/>
+    </mc:Choice>
+    <mc:Fallback xmlns="">
+      <p:transition spd="slow"/>
+    </mc:Fallback>
+  </mc:AlternateContent>
+  <p:timing>
+    <p:tnLst>
+      <p:par>
+        <p:cTn id="1" dur="indefinite" restart="never" nodeType="tmRoot"/>
+      </p:par>
+    </p:tnLst>
+  </p:timing>
+</p:sld>
+</file>
+
+<file path=ppt/slides/slide3.xml><?xml version="1.0" encoding="utf-8"?>
+<p:sld xmlns:a="http://schemas.openxmlformats.org/drawingml/2006/main" xmlns:r="http://schemas.openxmlformats.org/officeDocument/2006/relationships" xmlns:p="http://schemas.openxmlformats.org/presentationml/2006/main">
+  <p:cSld>
+    <p:spTree>
+      <p:nvGrpSpPr>
+        <p:cNvPr id="1" name=""/>
+        <p:cNvGrpSpPr/>
+        <p:nvPr/>
+      </p:nvGrpSpPr>
+      <p:grpSpPr>
+        <a:xfrm>
+          <a:off x="0" y="0"/>
+          <a:ext cx="0" cy="0"/>
+          <a:chOff x="0" y="0"/>
+          <a:chExt cx="0" cy="0"/>
+        </a:xfrm>
+      </p:grpSpPr>
+      <p:sp>
+        <p:nvSpPr>
+          <p:cNvPr id="5" name="Text Placeholder 4"/>
+          <p:cNvSpPr>
+            <a:spLocks noGrp="1"/>
+          </p:cNvSpPr>
+          <p:nvPr>
+            <p:ph type="body" sz="quarter" idx="13"/>
+          </p:nvPr>
+        </p:nvSpPr>
+        <p:spPr>
+          <a:xfrm>
+            <a:off x="963976" y="3293590"/>
+            <a:ext cx="10516334" cy="410505"/>
+          </a:xfrm>
+        </p:spPr>
+        <p:txBody>
+          <a:bodyPr/>
+          <a:lstStyle/>
+          <a:p>
+            <a:r>
+              <a:rPr lang="en-US" sz="2000" dirty="0" smtClean="0"/>
+              <a:t>Available for about a week</a:t>
+            </a:r>
+            <a:endParaRPr lang="en-US" sz="2000" dirty="0"/>
+          </a:p>
+        </p:txBody>
+      </p:sp>
+      <p:sp>
+        <p:nvSpPr>
+          <p:cNvPr id="2" name="Title 1"/>
+          <p:cNvSpPr>
+            <a:spLocks noGrp="1"/>
+          </p:cNvSpPr>
+          <p:nvPr>
+            <p:ph type="title"/>
+          </p:nvPr>
+        </p:nvSpPr>
+        <p:spPr/>
+        <p:txBody>
+          <a:bodyPr/>
+          <a:lstStyle/>
+          <a:p>
+            <a:r>
+              <a:rPr lang="en-US" sz="2800" dirty="0"/>
+              <a:t>https://</a:t>
+            </a:r>
+            <a:r>
+              <a:rPr lang="en-US" sz="2800" dirty="0" err="1"/>
+              <a:t>github.com</a:t>
+            </a:r>
+            <a:r>
+              <a:rPr lang="en-US" sz="2800" dirty="0"/>
+              <a:t>/</a:t>
+            </a:r>
+            <a:r>
+              <a:rPr lang="en-US" sz="2800" dirty="0" err="1"/>
+              <a:t>theJasonHelmick</a:t>
+            </a:r>
+            <a:r>
+              <a:rPr lang="en-US" sz="2800" dirty="0"/>
+              <a:t>/</a:t>
+            </a:r>
+            <a:r>
+              <a:rPr lang="en-US" sz="2800" dirty="0" err="1"/>
+              <a:t>PowerShellSaterday</a:t>
+            </a:r>
+            <a:endParaRPr lang="en-US" sz="2800" dirty="0"/>
+          </a:p>
+        </p:txBody>
+      </p:sp>
+      <p:sp>
+        <p:nvSpPr>
+          <p:cNvPr id="4" name="Text Placeholder 4"/>
+          <p:cNvSpPr>
+            <a:spLocks noGrp="1"/>
+          </p:cNvSpPr>
+          <p:nvPr>
+            <p:ph type="body" sz="quarter" idx="13"/>
+          </p:nvPr>
+        </p:nvSpPr>
+        <p:spPr>
+          <a:xfrm>
+            <a:off x="4641227" y="4623861"/>
+            <a:ext cx="3161831" cy="1017522"/>
+          </a:xfrm>
+        </p:spPr>
+        <p:txBody>
+          <a:bodyPr/>
+          <a:lstStyle/>
+          <a:p>
+            <a:r>
+              <a:rPr lang="en-US" sz="3600" smtClean="0"/>
+              <a:t>Thank you!</a:t>
+            </a:r>
+            <a:endParaRPr lang="en-US" sz="3600" dirty="0"/>
+          </a:p>
+        </p:txBody>
+      </p:sp>
+    </p:spTree>
+    <p:extLst>
+      <p:ext uri="{BB962C8B-B14F-4D97-AF65-F5344CB8AC3E}">
+        <p14:creationId xmlns:p14="http://schemas.microsoft.com/office/powerpoint/2010/main" val="2091773009"/>
       </p:ext>
     </p:extLst>
   </p:cSld>

</xml_diff>